<commit_message>
Upload updated PowerPoint Slides
</commit_message>
<xml_diff>
--- a/TFscale VGG16.pptx
+++ b/TFscale VGG16.pptx
@@ -292,6 +292,7 @@
     <p1510:client id="{0ACFBBA4-3770-4F84-8E3E-8D6F299DE2E1}" v="548" dt="2022-03-19T14:28:55.896"/>
     <p1510:client id="{154C8B1C-FB69-4DBF-BA7F-06648900745F}" v="1" dt="2022-03-20T23:32:38.016"/>
     <p1510:client id="{279EEC87-3A85-4EF4-8F2B-F22F0C7AE9C3}" v="57" dt="2022-03-20T13:37:36.518"/>
+    <p1510:client id="{3C5655B0-4C31-433E-B698-7E5DBFFEFE0E}" v="35" dt="2022-03-22T01:15:24.895"/>
     <p1510:client id="{9FA40476-B46B-4916-9F02-E0955B8E30AC}" v="383" dt="2022-03-20T13:30:14.333"/>
     <p1510:client id="{A938DF75-178C-449D-9FCB-4CA94759E4A7}" v="29" dt="2022-03-20T12:49:01.518"/>
     <p1510:client id="{B3BB326C-320C-4771-8D66-237F8DBCA580}" v="773" dt="2022-03-20T11:30:13.071"/>
@@ -27942,10 +27943,10 @@
           <a:lstStyle/>
           <a:p>
             <a:r>
-              <a:rPr lang="en"/>
-              <a:t>Image Annotation</a:t>
+              <a:rPr lang="en" dirty="0"/>
+              <a:t>Demo Preparations</a:t>
             </a:r>
-            <a:endParaRPr lang="en" b="0"/>
+            <a:endParaRPr lang="en-US" dirty="0"/>
           </a:p>
           <a:p>
             <a:endParaRPr lang="en"/>
@@ -28007,7 +28008,7 @@
         <p:spPr>
           <a:xfrm>
             <a:off x="1870775" y="3561450"/>
-            <a:ext cx="2103900" cy="592200"/>
+            <a:ext cx="2103900" cy="835087"/>
           </a:xfrm>
           <a:prstGeom prst="rect">
             <a:avLst/>
@@ -28021,8 +28022,8 @@
           <a:p>
             <a:pPr marL="0" indent="0"/>
             <a:r>
-              <a:rPr lang="en"/>
-              <a:t>Explanation on the usage of Image Annotation in VGG16</a:t>
+              <a:rPr lang="en" dirty="0"/>
+              <a:t>Explanation on the preparations required for the demo.</a:t>
             </a:r>
           </a:p>
         </p:txBody>

</xml_diff>